<commit_message>
Added file warnings, reject password file, other changes
</commit_message>
<xml_diff>
--- a/FileObjectExtractorTests/Resources/TestPowerpoint.pptx
+++ b/FileObjectExtractorTests/Resources/TestPowerpoint.pptx
@@ -104,6 +104,11 @@
       </a:defRPr>
     </a:lvl9pPr>
   </p:defaultTextStyle>
+  <p:extLst>
+    <p:ext uri="{EFAFB233-063F-42B5-8137-9DF3F51BA10A}">
+      <p15:sldGuideLst xmlns:p15="http://schemas.microsoft.com/office/powerpoint/2012/main"/>
+    </p:ext>
+  </p:extLst>
 </p:presentation>
 </file>
 
@@ -256,7 +261,7 @@
           <a:p>
             <a:fld id="{BDD0A033-A050-4244-86D1-42F34E99B67C}" type="datetimeFigureOut">
               <a:rPr lang="en-AU" smtClean="0"/>
-              <a:t>12/02/2025</a:t>
+              <a:t>2/03/2025</a:t>
             </a:fld>
             <a:endParaRPr lang="en-AU"/>
           </a:p>
@@ -456,7 +461,7 @@
           <a:p>
             <a:fld id="{BDD0A033-A050-4244-86D1-42F34E99B67C}" type="datetimeFigureOut">
               <a:rPr lang="en-AU" smtClean="0"/>
-              <a:t>12/02/2025</a:t>
+              <a:t>2/03/2025</a:t>
             </a:fld>
             <a:endParaRPr lang="en-AU"/>
           </a:p>
@@ -666,7 +671,7 @@
           <a:p>
             <a:fld id="{BDD0A033-A050-4244-86D1-42F34E99B67C}" type="datetimeFigureOut">
               <a:rPr lang="en-AU" smtClean="0"/>
-              <a:t>12/02/2025</a:t>
+              <a:t>2/03/2025</a:t>
             </a:fld>
             <a:endParaRPr lang="en-AU"/>
           </a:p>
@@ -866,7 +871,7 @@
           <a:p>
             <a:fld id="{BDD0A033-A050-4244-86D1-42F34E99B67C}" type="datetimeFigureOut">
               <a:rPr lang="en-AU" smtClean="0"/>
-              <a:t>12/02/2025</a:t>
+              <a:t>2/03/2025</a:t>
             </a:fld>
             <a:endParaRPr lang="en-AU"/>
           </a:p>
@@ -1142,7 +1147,7 @@
           <a:p>
             <a:fld id="{BDD0A033-A050-4244-86D1-42F34E99B67C}" type="datetimeFigureOut">
               <a:rPr lang="en-AU" smtClean="0"/>
-              <a:t>12/02/2025</a:t>
+              <a:t>2/03/2025</a:t>
             </a:fld>
             <a:endParaRPr lang="en-AU"/>
           </a:p>
@@ -1410,7 +1415,7 @@
           <a:p>
             <a:fld id="{BDD0A033-A050-4244-86D1-42F34E99B67C}" type="datetimeFigureOut">
               <a:rPr lang="en-AU" smtClean="0"/>
-              <a:t>12/02/2025</a:t>
+              <a:t>2/03/2025</a:t>
             </a:fld>
             <a:endParaRPr lang="en-AU"/>
           </a:p>
@@ -1825,7 +1830,7 @@
           <a:p>
             <a:fld id="{BDD0A033-A050-4244-86D1-42F34E99B67C}" type="datetimeFigureOut">
               <a:rPr lang="en-AU" smtClean="0"/>
-              <a:t>12/02/2025</a:t>
+              <a:t>2/03/2025</a:t>
             </a:fld>
             <a:endParaRPr lang="en-AU"/>
           </a:p>
@@ -1967,7 +1972,7 @@
           <a:p>
             <a:fld id="{BDD0A033-A050-4244-86D1-42F34E99B67C}" type="datetimeFigureOut">
               <a:rPr lang="en-AU" smtClean="0"/>
-              <a:t>12/02/2025</a:t>
+              <a:t>2/03/2025</a:t>
             </a:fld>
             <a:endParaRPr lang="en-AU"/>
           </a:p>
@@ -2080,7 +2085,7 @@
           <a:p>
             <a:fld id="{BDD0A033-A050-4244-86D1-42F34E99B67C}" type="datetimeFigureOut">
               <a:rPr lang="en-AU" smtClean="0"/>
-              <a:t>12/02/2025</a:t>
+              <a:t>2/03/2025</a:t>
             </a:fld>
             <a:endParaRPr lang="en-AU"/>
           </a:p>
@@ -2393,7 +2398,7 @@
           <a:p>
             <a:fld id="{BDD0A033-A050-4244-86D1-42F34E99B67C}" type="datetimeFigureOut">
               <a:rPr lang="en-AU" smtClean="0"/>
-              <a:t>12/02/2025</a:t>
+              <a:t>2/03/2025</a:t>
             </a:fld>
             <a:endParaRPr lang="en-AU"/>
           </a:p>
@@ -2682,7 +2687,7 @@
           <a:p>
             <a:fld id="{BDD0A033-A050-4244-86D1-42F34E99B67C}" type="datetimeFigureOut">
               <a:rPr lang="en-AU" smtClean="0"/>
-              <a:t>12/02/2025</a:t>
+              <a:t>2/03/2025</a:t>
             </a:fld>
             <a:endParaRPr lang="en-AU"/>
           </a:p>
@@ -2925,7 +2930,7 @@
           <a:p>
             <a:fld id="{BDD0A033-A050-4244-86D1-42F34E99B67C}" type="datetimeFigureOut">
               <a:rPr lang="en-AU" smtClean="0"/>
-              <a:t>12/02/2025</a:t>
+              <a:t>2/03/2025</a:t>
             </a:fld>
             <a:endParaRPr lang="en-AU"/>
           </a:p>
@@ -3774,6 +3779,132 @@
           </a:graphicData>
         </a:graphic>
       </p:graphicFrame>
+      <p:graphicFrame>
+        <p:nvGraphicFramePr>
+          <p:cNvPr id="7" name="Object 6">
+            <a:extLst>
+              <a:ext uri="{FF2B5EF4-FFF2-40B4-BE49-F238E27FC236}">
+                <a16:creationId xmlns:a16="http://schemas.microsoft.com/office/drawing/2014/main" id="{88E3B6F6-DEA9-D30E-71A1-68FB6063CB76}"/>
+              </a:ext>
+            </a:extLst>
+          </p:cNvPr>
+          <p:cNvGraphicFramePr>
+            <a:graphicFrameLocks noChangeAspect="1"/>
+          </p:cNvGraphicFramePr>
+          <p:nvPr>
+            <p:extLst>
+              <p:ext uri="{D42A27DB-BD31-4B8C-83A1-F6EECF244321}">
+                <p14:modId xmlns:p14="http://schemas.microsoft.com/office/powerpoint/2010/main" val="1630349822"/>
+              </p:ext>
+            </p:extLst>
+          </p:nvPr>
+        </p:nvGraphicFramePr>
+        <p:xfrm>
+          <a:off x="7059529" y="4053639"/>
+          <a:ext cx="914400" cy="771525"/>
+        </p:xfrm>
+        <a:graphic>
+          <a:graphicData uri="http://schemas.openxmlformats.org/presentationml/2006/ole">
+            <mc:AlternateContent xmlns:mc="http://schemas.openxmlformats.org/markup-compatibility/2006">
+              <mc:Choice xmlns:v="urn:schemas-microsoft-com:vml" Requires="v">
+                <p:oleObj name="Bitmap Image" showAsIcon="1" r:id="rId14" imgW="914502" imgH="771525" progId="Paint.Picture">
+                  <p:embed/>
+                </p:oleObj>
+              </mc:Choice>
+              <mc:Fallback>
+                <p:oleObj name="Bitmap Image" showAsIcon="1" r:id="rId14" imgW="914502" imgH="771525" progId="Paint.Picture">
+                  <p:embed/>
+                  <p:pic>
+                    <p:nvPicPr>
+                      <p:cNvPr id="0" name=""/>
+                      <p:cNvPicPr/>
+                      <p:nvPr/>
+                    </p:nvPicPr>
+                    <p:blipFill>
+                      <a:blip r:embed="rId15"/>
+                      <a:stretch>
+                        <a:fillRect/>
+                      </a:stretch>
+                    </p:blipFill>
+                    <p:spPr>
+                      <a:xfrm>
+                        <a:off x="7059529" y="4053639"/>
+                        <a:ext cx="914400" cy="771525"/>
+                      </a:xfrm>
+                      <a:prstGeom prst="rect">
+                        <a:avLst/>
+                      </a:prstGeom>
+                    </p:spPr>
+                  </p:pic>
+                </p:oleObj>
+              </mc:Fallback>
+            </mc:AlternateContent>
+          </a:graphicData>
+        </a:graphic>
+      </p:graphicFrame>
+      <p:graphicFrame>
+        <p:nvGraphicFramePr>
+          <p:cNvPr id="11" name="Object 10">
+            <a:extLst>
+              <a:ext uri="{FF2B5EF4-FFF2-40B4-BE49-F238E27FC236}">
+                <a16:creationId xmlns:a16="http://schemas.microsoft.com/office/drawing/2014/main" id="{75BF8DA1-AD7B-B63B-8FD5-621C33F8769D}"/>
+              </a:ext>
+            </a:extLst>
+          </p:cNvPr>
+          <p:cNvGraphicFramePr>
+            <a:graphicFrameLocks noChangeAspect="1"/>
+          </p:cNvGraphicFramePr>
+          <p:nvPr>
+            <p:extLst>
+              <p:ext uri="{D42A27DB-BD31-4B8C-83A1-F6EECF244321}">
+                <p14:modId xmlns:p14="http://schemas.microsoft.com/office/powerpoint/2010/main" val="1258448116"/>
+              </p:ext>
+            </p:extLst>
+          </p:nvPr>
+        </p:nvGraphicFramePr>
+        <p:xfrm>
+          <a:off x="5492499" y="-84932"/>
+          <a:ext cx="5737225" cy="6681787"/>
+        </p:xfrm>
+        <a:graphic>
+          <a:graphicData uri="http://schemas.openxmlformats.org/presentationml/2006/ole">
+            <mc:AlternateContent xmlns:mc="http://schemas.openxmlformats.org/markup-compatibility/2006">
+              <mc:Choice xmlns:v="urn:schemas-microsoft-com:vml" Requires="v">
+                <p:oleObj name="Document" r:id="rId16" imgW="5737207" imgH="6681925" progId="Word.Document.12">
+                  <p:embed/>
+                </p:oleObj>
+              </mc:Choice>
+              <mc:Fallback>
+                <p:oleObj name="Document" r:id="rId16" imgW="5737207" imgH="6681925" progId="Word.Document.12">
+                  <p:embed/>
+                  <p:pic>
+                    <p:nvPicPr>
+                      <p:cNvPr id="0" name=""/>
+                      <p:cNvPicPr/>
+                      <p:nvPr/>
+                    </p:nvPicPr>
+                    <p:blipFill>
+                      <a:blip r:embed="rId17"/>
+                      <a:stretch>
+                        <a:fillRect/>
+                      </a:stretch>
+                    </p:blipFill>
+                    <p:spPr>
+                      <a:xfrm>
+                        <a:off x="5492499" y="-84932"/>
+                        <a:ext cx="5737225" cy="6681787"/>
+                      </a:xfrm>
+                      <a:prstGeom prst="rect">
+                        <a:avLst/>
+                      </a:prstGeom>
+                    </p:spPr>
+                  </p:pic>
+                </p:oleObj>
+              </mc:Fallback>
+            </mc:AlternateContent>
+          </a:graphicData>
+        </a:graphic>
+      </p:graphicFrame>
     </p:spTree>
     <p:extLst>
       <p:ext uri="{BB962C8B-B14F-4D97-AF65-F5344CB8AC3E}">

</xml_diff>